<commit_message>
sidebar custom and 'chisono' page
</commit_message>
<xml_diff>
--- a/portfolio_esempio.pptx
+++ b/portfolio_esempio.pptx
@@ -289,7 +289,7 @@
           <a:p>
             <a:fld id="{7998F004-4310-4291-8B52-2CFC13739198}" type="datetimeFigureOut">
               <a:rPr lang="it-IT" smtClean="0"/>
-              <a:t>28/09/2023</a:t>
+              <a:t>12/10/2023</a:t>
             </a:fld>
             <a:endParaRPr lang="it-IT"/>
           </a:p>
@@ -459,7 +459,7 @@
           <a:p>
             <a:fld id="{7998F004-4310-4291-8B52-2CFC13739198}" type="datetimeFigureOut">
               <a:rPr lang="it-IT" smtClean="0"/>
-              <a:t>28/09/2023</a:t>
+              <a:t>12/10/2023</a:t>
             </a:fld>
             <a:endParaRPr lang="it-IT"/>
           </a:p>
@@ -639,7 +639,7 @@
           <a:p>
             <a:fld id="{7998F004-4310-4291-8B52-2CFC13739198}" type="datetimeFigureOut">
               <a:rPr lang="it-IT" smtClean="0"/>
-              <a:t>28/09/2023</a:t>
+              <a:t>12/10/2023</a:t>
             </a:fld>
             <a:endParaRPr lang="it-IT"/>
           </a:p>
@@ -809,7 +809,7 @@
           <a:p>
             <a:fld id="{7998F004-4310-4291-8B52-2CFC13739198}" type="datetimeFigureOut">
               <a:rPr lang="it-IT" smtClean="0"/>
-              <a:t>28/09/2023</a:t>
+              <a:t>12/10/2023</a:t>
             </a:fld>
             <a:endParaRPr lang="it-IT"/>
           </a:p>
@@ -1055,7 +1055,7 @@
           <a:p>
             <a:fld id="{7998F004-4310-4291-8B52-2CFC13739198}" type="datetimeFigureOut">
               <a:rPr lang="it-IT" smtClean="0"/>
-              <a:t>28/09/2023</a:t>
+              <a:t>12/10/2023</a:t>
             </a:fld>
             <a:endParaRPr lang="it-IT"/>
           </a:p>
@@ -1343,7 +1343,7 @@
           <a:p>
             <a:fld id="{7998F004-4310-4291-8B52-2CFC13739198}" type="datetimeFigureOut">
               <a:rPr lang="it-IT" smtClean="0"/>
-              <a:t>28/09/2023</a:t>
+              <a:t>12/10/2023</a:t>
             </a:fld>
             <a:endParaRPr lang="it-IT"/>
           </a:p>
@@ -1765,7 +1765,7 @@
           <a:p>
             <a:fld id="{7998F004-4310-4291-8B52-2CFC13739198}" type="datetimeFigureOut">
               <a:rPr lang="it-IT" smtClean="0"/>
-              <a:t>28/09/2023</a:t>
+              <a:t>12/10/2023</a:t>
             </a:fld>
             <a:endParaRPr lang="it-IT"/>
           </a:p>
@@ -1883,7 +1883,7 @@
           <a:p>
             <a:fld id="{7998F004-4310-4291-8B52-2CFC13739198}" type="datetimeFigureOut">
               <a:rPr lang="it-IT" smtClean="0"/>
-              <a:t>28/09/2023</a:t>
+              <a:t>12/10/2023</a:t>
             </a:fld>
             <a:endParaRPr lang="it-IT"/>
           </a:p>
@@ -1978,7 +1978,7 @@
           <a:p>
             <a:fld id="{7998F004-4310-4291-8B52-2CFC13739198}" type="datetimeFigureOut">
               <a:rPr lang="it-IT" smtClean="0"/>
-              <a:t>28/09/2023</a:t>
+              <a:t>12/10/2023</a:t>
             </a:fld>
             <a:endParaRPr lang="it-IT"/>
           </a:p>
@@ -2255,7 +2255,7 @@
           <a:p>
             <a:fld id="{7998F004-4310-4291-8B52-2CFC13739198}" type="datetimeFigureOut">
               <a:rPr lang="it-IT" smtClean="0"/>
-              <a:t>28/09/2023</a:t>
+              <a:t>12/10/2023</a:t>
             </a:fld>
             <a:endParaRPr lang="it-IT"/>
           </a:p>
@@ -2508,7 +2508,7 @@
           <a:p>
             <a:fld id="{7998F004-4310-4291-8B52-2CFC13739198}" type="datetimeFigureOut">
               <a:rPr lang="it-IT" smtClean="0"/>
-              <a:t>28/09/2023</a:t>
+              <a:t>12/10/2023</a:t>
             </a:fld>
             <a:endParaRPr lang="it-IT"/>
           </a:p>
@@ -2721,7 +2721,7 @@
           <a:p>
             <a:fld id="{7998F004-4310-4291-8B52-2CFC13739198}" type="datetimeFigureOut">
               <a:rPr lang="it-IT" smtClean="0"/>
-              <a:t>28/09/2023</a:t>
+              <a:t>12/10/2023</a:t>
             </a:fld>
             <a:endParaRPr lang="it-IT"/>
           </a:p>
@@ -3177,7 +3177,7 @@
         <p:spPr>
           <a:xfrm>
             <a:off x="2195736" y="116633"/>
-            <a:ext cx="6768752" cy="646331"/>
+            <a:ext cx="6768752" cy="1077218"/>
           </a:xfrm>
           <a:prstGeom prst="rect">
             <a:avLst/>
@@ -3192,9 +3192,31 @@
           <a:p>
             <a:r>
               <a:rPr lang="it-IT" sz="3600" dirty="0" smtClean="0"/>
-              <a:t>Portfolio di Francesco Di Clemente </a:t>
-            </a:r>
-            <a:endParaRPr lang="it-IT" sz="3600" dirty="0"/>
+              <a:t>Francesco </a:t>
+            </a:r>
+            <a:r>
+              <a:rPr lang="it-IT" sz="3600" dirty="0" smtClean="0"/>
+              <a:t>Di </a:t>
+            </a:r>
+            <a:r>
+              <a:rPr lang="it-IT" sz="3600" dirty="0" smtClean="0"/>
+              <a:t>Clemente</a:t>
+            </a:r>
+          </a:p>
+          <a:p>
+            <a:r>
+              <a:rPr lang="it-IT" sz="2800" dirty="0" smtClean="0"/>
+              <a:t>Junior </a:t>
+            </a:r>
+            <a:r>
+              <a:rPr lang="it-IT" sz="2800" dirty="0" err="1" smtClean="0"/>
+              <a:t>developer</a:t>
+            </a:r>
+            <a:r>
+              <a:rPr lang="it-IT" sz="2800" dirty="0" smtClean="0"/>
+              <a:t> </a:t>
+            </a:r>
+            <a:endParaRPr lang="it-IT" sz="2800" dirty="0"/>
           </a:p>
         </p:txBody>
       </p:sp>
@@ -3240,7 +3262,7 @@
         </p:nvSpPr>
         <p:spPr>
           <a:xfrm>
-            <a:off x="4370524" y="722729"/>
+            <a:off x="4788024" y="722729"/>
             <a:ext cx="4752528" cy="369332"/>
           </a:xfrm>
           <a:prstGeom prst="rect">

</xml_diff>